<commit_message>
Additions to Sensitivity Tests
Did a Bias correction/no bias correction test
Most of the leave-one-out survey sensitivity runs
</commit_message>
<xml_diff>
--- a/2023.RT.Runs/BSB WHAM Sensitivity Tests.pptx
+++ b/2023.RT.Runs/BSB WHAM Sensitivity Tests.pptx
@@ -270,7 +270,7 @@
           <a:p>
             <a:fld id="{BCE76315-5318-4C37-8130-0BE8558006F8}" type="datetimeFigureOut">
               <a:rPr lang="en-US" smtClean="0"/>
-              <a:t>2/1/2024</a:t>
+              <a:t>2/2/2024</a:t>
             </a:fld>
             <a:endParaRPr lang="en-US"/>
           </a:p>
@@ -584,49 +584,49 @@
           <a:p>
             <a:pPr lvl="1"/>
             <a:r>
-              <a:rPr lang="en-US" dirty="0" smtClean="0"/>
+              <a:rPr lang="en-US" sz="1100" dirty="0" smtClean="0"/>
               <a:t>Spring Albatross – 2dar1</a:t>
             </a:r>
           </a:p>
           <a:p>
             <a:pPr lvl="1"/>
             <a:r>
-              <a:rPr lang="en-US" dirty="0" smtClean="0"/>
+              <a:rPr lang="en-US" sz="1100" dirty="0" smtClean="0"/>
               <a:t>NEAMAP –            ar1_y</a:t>
             </a:r>
           </a:p>
           <a:p>
             <a:pPr lvl="1"/>
             <a:r>
-              <a:rPr lang="en-US" dirty="0" smtClean="0"/>
+              <a:rPr lang="en-US" sz="1100" dirty="0" smtClean="0"/>
               <a:t>MA –                     ar1_y</a:t>
             </a:r>
           </a:p>
           <a:p>
             <a:pPr lvl="1"/>
             <a:r>
-              <a:rPr lang="en-US" dirty="0" smtClean="0"/>
+              <a:rPr lang="en-US" sz="1100" dirty="0" smtClean="0"/>
               <a:t>RI –                       ar1_y</a:t>
             </a:r>
           </a:p>
           <a:p>
             <a:pPr lvl="1"/>
             <a:r>
-              <a:rPr lang="en-US" dirty="0" smtClean="0"/>
+              <a:rPr lang="en-US" sz="1100" dirty="0" smtClean="0"/>
               <a:t>CT –                       ar1_y</a:t>
             </a:r>
           </a:p>
           <a:p>
             <a:pPr lvl="1"/>
             <a:r>
-              <a:rPr lang="en-US" dirty="0" smtClean="0"/>
+              <a:rPr lang="en-US" sz="1100" dirty="0" smtClean="0"/>
               <a:t>NY-                       none</a:t>
             </a:r>
           </a:p>
           <a:p>
             <a:pPr lvl="1"/>
             <a:r>
-              <a:rPr lang="en-US" dirty="0" smtClean="0"/>
+              <a:rPr lang="en-US" sz="1100" dirty="0" smtClean="0"/>
               <a:t>Bigelow –              2dar1</a:t>
             </a:r>
           </a:p>
@@ -1339,6 +1339,258 @@
     <p:extLst>
       <p:ext uri="{BB962C8B-B14F-4D97-AF65-F5344CB8AC3E}">
         <p14:creationId xmlns:p14="http://schemas.microsoft.com/office/powerpoint/2010/main" val="2134327487"/>
+      </p:ext>
+    </p:extLst>
+  </p:cSld>
+  <p:clrMapOvr>
+    <a:masterClrMapping/>
+  </p:clrMapOvr>
+</p:notes>
+</file>
+
+<file path=ppt/notesSlides/notesSlide6.xml><?xml version="1.0" encoding="utf-8"?>
+<p:notes xmlns:a="http://schemas.openxmlformats.org/drawingml/2006/main" xmlns:r="http://schemas.openxmlformats.org/officeDocument/2006/relationships" xmlns:p="http://schemas.openxmlformats.org/presentationml/2006/main">
+  <p:cSld>
+    <p:spTree>
+      <p:nvGrpSpPr>
+        <p:cNvPr id="1" name=""/>
+        <p:cNvGrpSpPr/>
+        <p:nvPr/>
+      </p:nvGrpSpPr>
+      <p:grpSpPr>
+        <a:xfrm>
+          <a:off x="0" y="0"/>
+          <a:ext cx="0" cy="0"/>
+          <a:chOff x="0" y="0"/>
+          <a:chExt cx="0" cy="0"/>
+        </a:xfrm>
+      </p:grpSpPr>
+      <p:sp>
+        <p:nvSpPr>
+          <p:cNvPr id="2" name="Slide Image Placeholder 1"/>
+          <p:cNvSpPr>
+            <a:spLocks noGrp="1" noRot="1" noChangeAspect="1"/>
+          </p:cNvSpPr>
+          <p:nvPr>
+            <p:ph type="sldImg"/>
+          </p:nvPr>
+        </p:nvSpPr>
+        <p:spPr/>
+      </p:sp>
+      <p:sp>
+        <p:nvSpPr>
+          <p:cNvPr id="3" name="Notes Placeholder 2"/>
+          <p:cNvSpPr>
+            <a:spLocks noGrp="1"/>
+          </p:cNvSpPr>
+          <p:nvPr>
+            <p:ph type="body" idx="1"/>
+          </p:nvPr>
+        </p:nvSpPr>
+        <p:spPr/>
+        <p:txBody>
+          <a:bodyPr/>
+          <a:lstStyle/>
+          <a:p>
+            <a:endParaRPr lang="en-US" dirty="0"/>
+          </a:p>
+        </p:txBody>
+      </p:sp>
+      <p:sp>
+        <p:nvSpPr>
+          <p:cNvPr id="4" name="Slide Number Placeholder 3"/>
+          <p:cNvSpPr>
+            <a:spLocks noGrp="1"/>
+          </p:cNvSpPr>
+          <p:nvPr>
+            <p:ph type="sldNum" sz="quarter" idx="10"/>
+          </p:nvPr>
+        </p:nvSpPr>
+        <p:spPr/>
+        <p:txBody>
+          <a:bodyPr/>
+          <a:lstStyle/>
+          <a:p>
+            <a:fld id="{5DBD21DD-8E4A-412C-939F-361AD1C20860}" type="slidenum">
+              <a:rPr lang="en-US" smtClean="0"/>
+              <a:t>39</a:t>
+            </a:fld>
+            <a:endParaRPr lang="en-US"/>
+          </a:p>
+        </p:txBody>
+      </p:sp>
+    </p:spTree>
+    <p:extLst>
+      <p:ext uri="{BB962C8B-B14F-4D97-AF65-F5344CB8AC3E}">
+        <p14:creationId xmlns:p14="http://schemas.microsoft.com/office/powerpoint/2010/main" val="667175516"/>
+      </p:ext>
+    </p:extLst>
+  </p:cSld>
+  <p:clrMapOvr>
+    <a:masterClrMapping/>
+  </p:clrMapOvr>
+</p:notes>
+</file>
+
+<file path=ppt/notesSlides/notesSlide7.xml><?xml version="1.0" encoding="utf-8"?>
+<p:notes xmlns:a="http://schemas.openxmlformats.org/drawingml/2006/main" xmlns:r="http://schemas.openxmlformats.org/officeDocument/2006/relationships" xmlns:p="http://schemas.openxmlformats.org/presentationml/2006/main">
+  <p:cSld>
+    <p:spTree>
+      <p:nvGrpSpPr>
+        <p:cNvPr id="1" name=""/>
+        <p:cNvGrpSpPr/>
+        <p:nvPr/>
+      </p:nvGrpSpPr>
+      <p:grpSpPr>
+        <a:xfrm>
+          <a:off x="0" y="0"/>
+          <a:ext cx="0" cy="0"/>
+          <a:chOff x="0" y="0"/>
+          <a:chExt cx="0" cy="0"/>
+        </a:xfrm>
+      </p:grpSpPr>
+      <p:sp>
+        <p:nvSpPr>
+          <p:cNvPr id="2" name="Slide Image Placeholder 1"/>
+          <p:cNvSpPr>
+            <a:spLocks noGrp="1" noRot="1" noChangeAspect="1"/>
+          </p:cNvSpPr>
+          <p:nvPr>
+            <p:ph type="sldImg"/>
+          </p:nvPr>
+        </p:nvSpPr>
+        <p:spPr/>
+      </p:sp>
+      <p:sp>
+        <p:nvSpPr>
+          <p:cNvPr id="3" name="Notes Placeholder 2"/>
+          <p:cNvSpPr>
+            <a:spLocks noGrp="1"/>
+          </p:cNvSpPr>
+          <p:nvPr>
+            <p:ph type="body" idx="1"/>
+          </p:nvPr>
+        </p:nvSpPr>
+        <p:spPr/>
+        <p:txBody>
+          <a:bodyPr/>
+          <a:lstStyle/>
+          <a:p>
+            <a:endParaRPr lang="en-US" dirty="0"/>
+          </a:p>
+        </p:txBody>
+      </p:sp>
+      <p:sp>
+        <p:nvSpPr>
+          <p:cNvPr id="4" name="Slide Number Placeholder 3"/>
+          <p:cNvSpPr>
+            <a:spLocks noGrp="1"/>
+          </p:cNvSpPr>
+          <p:nvPr>
+            <p:ph type="sldNum" sz="quarter" idx="10"/>
+          </p:nvPr>
+        </p:nvSpPr>
+        <p:spPr/>
+        <p:txBody>
+          <a:bodyPr/>
+          <a:lstStyle/>
+          <a:p>
+            <a:fld id="{5DBD21DD-8E4A-412C-939F-361AD1C20860}" type="slidenum">
+              <a:rPr lang="en-US" smtClean="0"/>
+              <a:t>47</a:t>
+            </a:fld>
+            <a:endParaRPr lang="en-US"/>
+          </a:p>
+        </p:txBody>
+      </p:sp>
+    </p:spTree>
+    <p:extLst>
+      <p:ext uri="{BB962C8B-B14F-4D97-AF65-F5344CB8AC3E}">
+        <p14:creationId xmlns:p14="http://schemas.microsoft.com/office/powerpoint/2010/main" val="3672750161"/>
+      </p:ext>
+    </p:extLst>
+  </p:cSld>
+  <p:clrMapOvr>
+    <a:masterClrMapping/>
+  </p:clrMapOvr>
+</p:notes>
+</file>
+
+<file path=ppt/notesSlides/notesSlide8.xml><?xml version="1.0" encoding="utf-8"?>
+<p:notes xmlns:a="http://schemas.openxmlformats.org/drawingml/2006/main" xmlns:r="http://schemas.openxmlformats.org/officeDocument/2006/relationships" xmlns:p="http://schemas.openxmlformats.org/presentationml/2006/main">
+  <p:cSld>
+    <p:spTree>
+      <p:nvGrpSpPr>
+        <p:cNvPr id="1" name=""/>
+        <p:cNvGrpSpPr/>
+        <p:nvPr/>
+      </p:nvGrpSpPr>
+      <p:grpSpPr>
+        <a:xfrm>
+          <a:off x="0" y="0"/>
+          <a:ext cx="0" cy="0"/>
+          <a:chOff x="0" y="0"/>
+          <a:chExt cx="0" cy="0"/>
+        </a:xfrm>
+      </p:grpSpPr>
+      <p:sp>
+        <p:nvSpPr>
+          <p:cNvPr id="2" name="Slide Image Placeholder 1"/>
+          <p:cNvSpPr>
+            <a:spLocks noGrp="1" noRot="1" noChangeAspect="1"/>
+          </p:cNvSpPr>
+          <p:nvPr>
+            <p:ph type="sldImg"/>
+          </p:nvPr>
+        </p:nvSpPr>
+        <p:spPr/>
+      </p:sp>
+      <p:sp>
+        <p:nvSpPr>
+          <p:cNvPr id="3" name="Notes Placeholder 2"/>
+          <p:cNvSpPr>
+            <a:spLocks noGrp="1"/>
+          </p:cNvSpPr>
+          <p:nvPr>
+            <p:ph type="body" idx="1"/>
+          </p:nvPr>
+        </p:nvSpPr>
+        <p:spPr/>
+        <p:txBody>
+          <a:bodyPr/>
+          <a:lstStyle/>
+          <a:p>
+            <a:endParaRPr lang="en-US" dirty="0"/>
+          </a:p>
+        </p:txBody>
+      </p:sp>
+      <p:sp>
+        <p:nvSpPr>
+          <p:cNvPr id="4" name="Slide Number Placeholder 3"/>
+          <p:cNvSpPr>
+            <a:spLocks noGrp="1"/>
+          </p:cNvSpPr>
+          <p:nvPr>
+            <p:ph type="sldNum" sz="quarter" idx="10"/>
+          </p:nvPr>
+        </p:nvSpPr>
+        <p:spPr/>
+        <p:txBody>
+          <a:bodyPr/>
+          <a:lstStyle/>
+          <a:p>
+            <a:fld id="{5DBD21DD-8E4A-412C-939F-361AD1C20860}" type="slidenum">
+              <a:rPr lang="en-US" smtClean="0"/>
+              <a:t>48</a:t>
+            </a:fld>
+            <a:endParaRPr lang="en-US"/>
+          </a:p>
+        </p:txBody>
+      </p:sp>
+    </p:spTree>
+    <p:extLst>
+      <p:ext uri="{BB962C8B-B14F-4D97-AF65-F5344CB8AC3E}">
+        <p14:creationId xmlns:p14="http://schemas.microsoft.com/office/powerpoint/2010/main" val="3341692117"/>
       </p:ext>
     </p:extLst>
   </p:cSld>
@@ -1479,7 +1731,7 @@
           <a:p>
             <a:fld id="{E946A1EF-D084-4303-9967-3757BA40A8BB}" type="datetimeFigureOut">
               <a:rPr lang="en-US" smtClean="0"/>
-              <a:t>2/1/2024</a:t>
+              <a:t>2/2/2024</a:t>
             </a:fld>
             <a:endParaRPr lang="en-US"/>
           </a:p>
@@ -1649,7 +1901,7 @@
           <a:p>
             <a:fld id="{E946A1EF-D084-4303-9967-3757BA40A8BB}" type="datetimeFigureOut">
               <a:rPr lang="en-US" smtClean="0"/>
-              <a:t>2/1/2024</a:t>
+              <a:t>2/2/2024</a:t>
             </a:fld>
             <a:endParaRPr lang="en-US"/>
           </a:p>
@@ -1829,7 +2081,7 @@
           <a:p>
             <a:fld id="{E946A1EF-D084-4303-9967-3757BA40A8BB}" type="datetimeFigureOut">
               <a:rPr lang="en-US" smtClean="0"/>
-              <a:t>2/1/2024</a:t>
+              <a:t>2/2/2024</a:t>
             </a:fld>
             <a:endParaRPr lang="en-US"/>
           </a:p>
@@ -1999,7 +2251,7 @@
           <a:p>
             <a:fld id="{E946A1EF-D084-4303-9967-3757BA40A8BB}" type="datetimeFigureOut">
               <a:rPr lang="en-US" smtClean="0"/>
-              <a:t>2/1/2024</a:t>
+              <a:t>2/2/2024</a:t>
             </a:fld>
             <a:endParaRPr lang="en-US"/>
           </a:p>
@@ -2245,7 +2497,7 @@
           <a:p>
             <a:fld id="{E946A1EF-D084-4303-9967-3757BA40A8BB}" type="datetimeFigureOut">
               <a:rPr lang="en-US" smtClean="0"/>
-              <a:t>2/1/2024</a:t>
+              <a:t>2/2/2024</a:t>
             </a:fld>
             <a:endParaRPr lang="en-US"/>
           </a:p>
@@ -2477,7 +2729,7 @@
           <a:p>
             <a:fld id="{E946A1EF-D084-4303-9967-3757BA40A8BB}" type="datetimeFigureOut">
               <a:rPr lang="en-US" smtClean="0"/>
-              <a:t>2/1/2024</a:t>
+              <a:t>2/2/2024</a:t>
             </a:fld>
             <a:endParaRPr lang="en-US"/>
           </a:p>
@@ -2844,7 +3096,7 @@
           <a:p>
             <a:fld id="{E946A1EF-D084-4303-9967-3757BA40A8BB}" type="datetimeFigureOut">
               <a:rPr lang="en-US" smtClean="0"/>
-              <a:t>2/1/2024</a:t>
+              <a:t>2/2/2024</a:t>
             </a:fld>
             <a:endParaRPr lang="en-US"/>
           </a:p>
@@ -2962,7 +3214,7 @@
           <a:p>
             <a:fld id="{E946A1EF-D084-4303-9967-3757BA40A8BB}" type="datetimeFigureOut">
               <a:rPr lang="en-US" smtClean="0"/>
-              <a:t>2/1/2024</a:t>
+              <a:t>2/2/2024</a:t>
             </a:fld>
             <a:endParaRPr lang="en-US"/>
           </a:p>
@@ -3057,7 +3309,7 @@
           <a:p>
             <a:fld id="{E946A1EF-D084-4303-9967-3757BA40A8BB}" type="datetimeFigureOut">
               <a:rPr lang="en-US" smtClean="0"/>
-              <a:t>2/1/2024</a:t>
+              <a:t>2/2/2024</a:t>
             </a:fld>
             <a:endParaRPr lang="en-US"/>
           </a:p>
@@ -3334,7 +3586,7 @@
           <a:p>
             <a:fld id="{E946A1EF-D084-4303-9967-3757BA40A8BB}" type="datetimeFigureOut">
               <a:rPr lang="en-US" smtClean="0"/>
-              <a:t>2/1/2024</a:t>
+              <a:t>2/2/2024</a:t>
             </a:fld>
             <a:endParaRPr lang="en-US"/>
           </a:p>
@@ -3587,7 +3839,7 @@
           <a:p>
             <a:fld id="{E946A1EF-D084-4303-9967-3757BA40A8BB}" type="datetimeFigureOut">
               <a:rPr lang="en-US" smtClean="0"/>
-              <a:t>2/1/2024</a:t>
+              <a:t>2/2/2024</a:t>
             </a:fld>
             <a:endParaRPr lang="en-US"/>
           </a:p>
@@ -3800,7 +4052,7 @@
           <a:p>
             <a:fld id="{E946A1EF-D084-4303-9967-3757BA40A8BB}" type="datetimeFigureOut">
               <a:rPr lang="en-US" smtClean="0"/>
-              <a:t>2/1/2024</a:t>
+              <a:t>2/2/2024</a:t>
             </a:fld>
             <a:endParaRPr lang="en-US"/>
           </a:p>
@@ -6349,8 +6601,20 @@
                   </a:schemeClr>
                 </a:solidFill>
               </a:rPr>
-              <a:t> RE: none </a:t>
-            </a:r>
+              <a:t> RE: </a:t>
+            </a:r>
+            <a:r>
+              <a:rPr lang="en-US" dirty="0" smtClean="0">
+                <a:solidFill>
+                  <a:schemeClr val="accent5">
+                    <a:lumMod val="75000"/>
+                  </a:schemeClr>
+                </a:solidFill>
+              </a:rPr>
+              <a:t>none</a:t>
+            </a:r>
+          </a:p>
+          <a:p>
             <a:r>
               <a:rPr lang="en-US" dirty="0" smtClean="0">
                 <a:solidFill>
@@ -6359,7 +6623,17 @@
                   </a:schemeClr>
                 </a:solidFill>
               </a:rPr>
-              <a:t>Age comp: </a:t>
+              <a:t>Age </a:t>
+            </a:r>
+            <a:r>
+              <a:rPr lang="en-US" dirty="0" smtClean="0">
+                <a:solidFill>
+                  <a:schemeClr val="accent4">
+                    <a:lumMod val="75000"/>
+                  </a:schemeClr>
+                </a:solidFill>
+              </a:rPr>
+              <a:t>comp: </a:t>
             </a:r>
             <a:r>
               <a:rPr lang="en-US" dirty="0" err="1" smtClean="0">
@@ -8907,6 +9181,146 @@
           </a:p>
         </p:txBody>
       </p:sp>
+      <p:sp>
+        <p:nvSpPr>
+          <p:cNvPr id="3" name="Rectangle 2"/>
+          <p:cNvSpPr/>
+          <p:nvPr/>
+        </p:nvSpPr>
+        <p:spPr>
+          <a:xfrm>
+            <a:off x="690880" y="5287774"/>
+            <a:ext cx="6096000" cy="1200329"/>
+          </a:xfrm>
+          <a:prstGeom prst="rect">
+            <a:avLst/>
+          </a:prstGeom>
+        </p:spPr>
+        <p:txBody>
+          <a:bodyPr>
+            <a:spAutoFit/>
+          </a:bodyPr>
+          <a:lstStyle/>
+          <a:p>
+            <a:r>
+              <a:rPr lang="en-US" dirty="0"/>
+              <a:t> </a:t>
+            </a:r>
+            <a:r>
+              <a:rPr lang="en-US" dirty="0" smtClean="0"/>
+              <a:t>              </a:t>
+            </a:r>
+            <a:r>
+              <a:rPr lang="en-US" dirty="0" err="1" smtClean="0"/>
+              <a:t>dAIC</a:t>
+            </a:r>
+            <a:r>
+              <a:rPr lang="en-US" dirty="0" smtClean="0"/>
+              <a:t>     </a:t>
+            </a:r>
+            <a:r>
+              <a:rPr lang="en-US" dirty="0"/>
+              <a:t>AIC  </a:t>
+            </a:r>
+            <a:r>
+              <a:rPr lang="en-US" dirty="0" smtClean="0"/>
+              <a:t>          </a:t>
+            </a:r>
+            <a:r>
+              <a:rPr lang="en-US" dirty="0" err="1" smtClean="0"/>
+              <a:t>rho_R</a:t>
+            </a:r>
+            <a:r>
+              <a:rPr lang="en-US" dirty="0" smtClean="0"/>
+              <a:t>       </a:t>
+            </a:r>
+            <a:r>
+              <a:rPr lang="en-US" dirty="0" err="1" smtClean="0"/>
+              <a:t>rho_SSB</a:t>
+            </a:r>
+            <a:r>
+              <a:rPr lang="en-US" dirty="0" smtClean="0"/>
+              <a:t>      </a:t>
+            </a:r>
+            <a:r>
+              <a:rPr lang="en-US" dirty="0" err="1"/>
+              <a:t>rho_Fbar</a:t>
+            </a:r>
+            <a:endParaRPr lang="en-US" dirty="0"/>
+          </a:p>
+          <a:p>
+            <a:r>
+              <a:rPr lang="en-US" dirty="0"/>
+              <a:t>Run35  </a:t>
+            </a:r>
+            <a:r>
+              <a:rPr lang="en-US" dirty="0" smtClean="0"/>
+              <a:t> 0.0        -</a:t>
+            </a:r>
+            <a:r>
+              <a:rPr lang="en-US" dirty="0"/>
+              <a:t>1566.0 </a:t>
+            </a:r>
+            <a:r>
+              <a:rPr lang="en-US" dirty="0" smtClean="0"/>
+              <a:t>    0.3388     0.0149         -</a:t>
+            </a:r>
+            <a:r>
+              <a:rPr lang="en-US" dirty="0"/>
+              <a:t>0.0242</a:t>
+            </a:r>
+          </a:p>
+          <a:p>
+            <a:r>
+              <a:rPr lang="en-US" dirty="0"/>
+              <a:t>Run36  </a:t>
+            </a:r>
+            <a:r>
+              <a:rPr lang="en-US" dirty="0" smtClean="0"/>
+              <a:t> 0.8        -</a:t>
+            </a:r>
+            <a:r>
+              <a:rPr lang="en-US" dirty="0"/>
+              <a:t>1565.2 </a:t>
+            </a:r>
+            <a:r>
+              <a:rPr lang="en-US" dirty="0" smtClean="0"/>
+              <a:t>    1.0454     0.2980         -</a:t>
+            </a:r>
+            <a:r>
+              <a:rPr lang="en-US" dirty="0"/>
+              <a:t>0.2165</a:t>
+            </a:r>
+          </a:p>
+          <a:p>
+            <a:r>
+              <a:rPr lang="en-US" dirty="0"/>
+              <a:t>Run34  </a:t>
+            </a:r>
+            <a:r>
+              <a:rPr lang="en-US" dirty="0" smtClean="0"/>
+              <a:t> 7.8        -</a:t>
+            </a:r>
+            <a:r>
+              <a:rPr lang="en-US" dirty="0"/>
+              <a:t>1558.2 </a:t>
+            </a:r>
+            <a:r>
+              <a:rPr lang="en-US" dirty="0" smtClean="0"/>
+              <a:t>    0.1209    -</a:t>
+            </a:r>
+            <a:r>
+              <a:rPr lang="en-US" dirty="0"/>
+              <a:t>0.0579   </a:t>
+            </a:r>
+            <a:r>
+              <a:rPr lang="en-US" dirty="0" smtClean="0"/>
+              <a:t>       0.0598</a:t>
+            </a:r>
+            <a:endParaRPr lang="en-US" dirty="0"/>
+          </a:p>
+        </p:txBody>
+      </p:sp>
     </p:spTree>
     <p:extLst>
       <p:ext uri="{BB962C8B-B14F-4D97-AF65-F5344CB8AC3E}">
@@ -8946,7 +9360,7 @@
           <p:nvPr/>
         </p:nvPicPr>
         <p:blipFill>
-          <a:blip r:embed="rId2" cstate="print">
+          <a:blip r:embed="rId3" cstate="print">
             <a:extLst>
               <a:ext uri="{28A0092B-C50C-407E-A947-70E740481C1C}">
                 <a14:useLocalDpi xmlns:a14="http://schemas.microsoft.com/office/drawing/2010/main" val="0"/>
@@ -8976,7 +9390,7 @@
           <p:nvPr/>
         </p:nvPicPr>
         <p:blipFill>
-          <a:blip r:embed="rId3" cstate="print">
+          <a:blip r:embed="rId4" cstate="print">
             <a:extLst>
               <a:ext uri="{28A0092B-C50C-407E-A947-70E740481C1C}">
                 <a14:useLocalDpi xmlns:a14="http://schemas.microsoft.com/office/drawing/2010/main" val="0"/>
@@ -9006,7 +9420,7 @@
           <p:nvPr/>
         </p:nvPicPr>
         <p:blipFill>
-          <a:blip r:embed="rId4" cstate="print">
+          <a:blip r:embed="rId5" cstate="print">
             <a:extLst>
               <a:ext uri="{28A0092B-C50C-407E-A947-70E740481C1C}">
                 <a14:useLocalDpi xmlns:a14="http://schemas.microsoft.com/office/drawing/2010/main" val="0"/>
@@ -9263,7 +9677,15 @@
           <a:p>
             <a:r>
               <a:rPr lang="en-US" dirty="0" smtClean="0"/>
-              <a:t>Run 35-36 (Option 1) </a:t>
+              <a:t>Run </a:t>
+            </a:r>
+            <a:r>
+              <a:rPr lang="en-US" dirty="0" smtClean="0"/>
+              <a:t>39-40 </a:t>
+            </a:r>
+            <a:r>
+              <a:rPr lang="en-US" dirty="0" smtClean="0"/>
+              <a:t>(Option 1) </a:t>
             </a:r>
             <a:endParaRPr lang="en-US" dirty="0"/>
           </a:p>
@@ -10168,6 +10590,186 @@
               </a:rPr>
               <a:t>Age-invariant M fixed at 0.2</a:t>
             </a:r>
+          </a:p>
+        </p:txBody>
+      </p:sp>
+      <p:sp>
+        <p:nvSpPr>
+          <p:cNvPr id="3" name="Rectangle 2"/>
+          <p:cNvSpPr/>
+          <p:nvPr/>
+        </p:nvSpPr>
+        <p:spPr>
+          <a:xfrm>
+            <a:off x="771686" y="4807016"/>
+            <a:ext cx="6096000" cy="1477328"/>
+          </a:xfrm>
+          <a:prstGeom prst="rect">
+            <a:avLst/>
+          </a:prstGeom>
+        </p:spPr>
+        <p:txBody>
+          <a:bodyPr>
+            <a:spAutoFit/>
+          </a:bodyPr>
+          <a:lstStyle/>
+          <a:p>
+            <a:r>
+              <a:rPr lang="en-US" dirty="0"/>
+              <a:t> </a:t>
+            </a:r>
+            <a:r>
+              <a:rPr lang="en-US" dirty="0" smtClean="0"/>
+              <a:t>              </a:t>
+            </a:r>
+            <a:r>
+              <a:rPr lang="en-US" dirty="0" err="1" smtClean="0"/>
+              <a:t>dAIC</a:t>
+            </a:r>
+            <a:r>
+              <a:rPr lang="en-US" dirty="0" smtClean="0"/>
+              <a:t>     </a:t>
+            </a:r>
+            <a:r>
+              <a:rPr lang="en-US" dirty="0"/>
+              <a:t>AIC  </a:t>
+            </a:r>
+            <a:r>
+              <a:rPr lang="en-US" dirty="0" smtClean="0"/>
+              <a:t>        </a:t>
+            </a:r>
+            <a:r>
+              <a:rPr lang="en-US" dirty="0" err="1" smtClean="0"/>
+              <a:t>rho_R</a:t>
+            </a:r>
+            <a:r>
+              <a:rPr lang="en-US" dirty="0" smtClean="0"/>
+              <a:t>     </a:t>
+            </a:r>
+            <a:r>
+              <a:rPr lang="en-US" dirty="0" err="1" smtClean="0"/>
+              <a:t>rho_SSB</a:t>
+            </a:r>
+            <a:r>
+              <a:rPr lang="en-US" dirty="0" smtClean="0"/>
+              <a:t>    </a:t>
+            </a:r>
+            <a:r>
+              <a:rPr lang="en-US" dirty="0" err="1" smtClean="0"/>
+              <a:t>rho_Fbar</a:t>
+            </a:r>
+            <a:endParaRPr lang="en-US" dirty="0"/>
+          </a:p>
+          <a:p>
+            <a:r>
+              <a:rPr lang="en-US" dirty="0"/>
+              <a:t>Run39  </a:t>
+            </a:r>
+            <a:r>
+              <a:rPr lang="en-US" dirty="0" smtClean="0"/>
+              <a:t>  0.0      -</a:t>
+            </a:r>
+            <a:r>
+              <a:rPr lang="en-US" dirty="0"/>
+              <a:t>1566.3 </a:t>
+            </a:r>
+            <a:r>
+              <a:rPr lang="en-US" dirty="0" smtClean="0"/>
+              <a:t>   0.1026   -</a:t>
+            </a:r>
+            <a:r>
+              <a:rPr lang="en-US" dirty="0"/>
+              <a:t>0.0850   </a:t>
+            </a:r>
+            <a:r>
+              <a:rPr lang="en-US" dirty="0" smtClean="0"/>
+              <a:t>   0.0869</a:t>
+            </a:r>
+            <a:endParaRPr lang="en-US" dirty="0"/>
+          </a:p>
+          <a:p>
+            <a:r>
+              <a:rPr lang="en-US" dirty="0"/>
+              <a:t>Run35  </a:t>
+            </a:r>
+            <a:r>
+              <a:rPr lang="en-US" dirty="0" smtClean="0"/>
+              <a:t>  0.3      -</a:t>
+            </a:r>
+            <a:r>
+              <a:rPr lang="en-US" dirty="0"/>
+              <a:t>1566.0 </a:t>
+            </a:r>
+            <a:r>
+              <a:rPr lang="en-US" dirty="0" smtClean="0"/>
+              <a:t>   0.3388    0.0149     -</a:t>
+            </a:r>
+            <a:r>
+              <a:rPr lang="en-US" dirty="0"/>
+              <a:t>0.0242</a:t>
+            </a:r>
+          </a:p>
+          <a:p>
+            <a:r>
+              <a:rPr lang="en-US" dirty="0"/>
+              <a:t>Run34 </a:t>
+            </a:r>
+            <a:r>
+              <a:rPr lang="en-US" dirty="0" smtClean="0"/>
+              <a:t>   </a:t>
+            </a:r>
+            <a:r>
+              <a:rPr lang="en-US" dirty="0"/>
+              <a:t>8.1 </a:t>
+            </a:r>
+            <a:r>
+              <a:rPr lang="en-US" dirty="0" smtClean="0"/>
+              <a:t>     -</a:t>
+            </a:r>
+            <a:r>
+              <a:rPr lang="en-US" dirty="0"/>
+              <a:t>1558.2 </a:t>
+            </a:r>
+            <a:r>
+              <a:rPr lang="en-US" dirty="0" smtClean="0"/>
+              <a:t>   0.1209   -</a:t>
+            </a:r>
+            <a:r>
+              <a:rPr lang="en-US" dirty="0"/>
+              <a:t>0.0579   </a:t>
+            </a:r>
+            <a:r>
+              <a:rPr lang="en-US" dirty="0" smtClean="0"/>
+              <a:t>   0.0598</a:t>
+            </a:r>
+            <a:endParaRPr lang="en-US" dirty="0"/>
+          </a:p>
+          <a:p>
+            <a:r>
+              <a:rPr lang="en-US" dirty="0"/>
+              <a:t>Run40 </a:t>
+            </a:r>
+            <a:r>
+              <a:rPr lang="en-US" dirty="0" smtClean="0"/>
+              <a:t> 20.8      -1545.5    </a:t>
+            </a:r>
+            <a:r>
+              <a:rPr lang="en-US" dirty="0"/>
+              <a:t>0.1289 </a:t>
+            </a:r>
+            <a:r>
+              <a:rPr lang="en-US" dirty="0" smtClean="0"/>
+              <a:t>  -</a:t>
+            </a:r>
+            <a:r>
+              <a:rPr lang="en-US" dirty="0"/>
+              <a:t>0.0414   </a:t>
+            </a:r>
+            <a:r>
+              <a:rPr lang="en-US" dirty="0" smtClean="0"/>
+              <a:t>   0.0451 </a:t>
+            </a:r>
+            <a:endParaRPr lang="en-US" dirty="0"/>
           </a:p>
         </p:txBody>
       </p:sp>
@@ -11667,7 +12269,7 @@
           <p:nvPr/>
         </p:nvPicPr>
         <p:blipFill>
-          <a:blip r:embed="rId2" cstate="print">
+          <a:blip r:embed="rId3" cstate="print">
             <a:extLst>
               <a:ext uri="{28A0092B-C50C-407E-A947-70E740481C1C}">
                 <a14:useLocalDpi xmlns:a14="http://schemas.microsoft.com/office/drawing/2010/main" val="0"/>
@@ -11697,7 +12299,7 @@
           <p:nvPr/>
         </p:nvPicPr>
         <p:blipFill>
-          <a:blip r:embed="rId3" cstate="print">
+          <a:blip r:embed="rId4" cstate="print">
             <a:extLst>
               <a:ext uri="{28A0092B-C50C-407E-A947-70E740481C1C}">
                 <a14:useLocalDpi xmlns:a14="http://schemas.microsoft.com/office/drawing/2010/main" val="0"/>
@@ -11718,6 +12320,57 @@
           </a:prstGeom>
         </p:spPr>
       </p:pic>
+      <p:sp>
+        <p:nvSpPr>
+          <p:cNvPr id="2" name="TextBox 1"/>
+          <p:cNvSpPr txBox="1"/>
+          <p:nvPr/>
+        </p:nvSpPr>
+        <p:spPr>
+          <a:xfrm>
+            <a:off x="10058400" y="2296160"/>
+            <a:ext cx="2350131" cy="923330"/>
+          </a:xfrm>
+          <a:prstGeom prst="rect">
+            <a:avLst/>
+          </a:prstGeom>
+          <a:noFill/>
+        </p:spPr>
+        <p:txBody>
+          <a:bodyPr wrap="none" rtlCol="0">
+            <a:spAutoFit/>
+          </a:bodyPr>
+          <a:lstStyle/>
+          <a:p>
+            <a:r>
+              <a:rPr lang="en-US" dirty="0" smtClean="0"/>
+              <a:t>Run41 – Fixed at </a:t>
+            </a:r>
+            <a:r>
+              <a:rPr lang="en-US" dirty="0" err="1" smtClean="0"/>
+              <a:t>est</a:t>
+            </a:r>
+            <a:endParaRPr lang="en-US" dirty="0" smtClean="0"/>
+          </a:p>
+          <a:p>
+            <a:r>
+              <a:rPr lang="en-US" dirty="0" smtClean="0"/>
+              <a:t>Run42 – Fixed at lower</a:t>
+            </a:r>
+          </a:p>
+          <a:p>
+            <a:r>
+              <a:rPr lang="en-US" dirty="0" smtClean="0"/>
+              <a:t>Run43 – Fixed </a:t>
+            </a:r>
+            <a:r>
+              <a:rPr lang="en-US" smtClean="0"/>
+              <a:t>at upper</a:t>
+            </a:r>
+            <a:endParaRPr lang="en-US" dirty="0"/>
+          </a:p>
+        </p:txBody>
+      </p:sp>
     </p:spTree>
     <p:extLst>
       <p:ext uri="{BB962C8B-B14F-4D97-AF65-F5344CB8AC3E}">
@@ -11802,8 +12455,13 @@
             </a:pPr>
             <a:r>
               <a:rPr lang="en-US" dirty="0" smtClean="0"/>
-              <a:t>Compare WHAM run with run with each index individually, rather than the VAST INDEX</a:t>
-            </a:r>
+              <a:t>Compare WHAM run with run with each index individually, rather than the VAST </a:t>
+            </a:r>
+            <a:r>
+              <a:rPr lang="en-US" dirty="0" smtClean="0"/>
+              <a:t>INDEX -&gt; relax catchability and selectivity </a:t>
+            </a:r>
+            <a:endParaRPr lang="en-US" dirty="0" smtClean="0"/>
           </a:p>
           <a:p>
             <a:pPr marL="514350" indent="-514350">

</xml_diff>